<commit_message>
fixed white line covering ball point issue
</commit_message>
<xml_diff>
--- a/Graph_automization/Ball_and_stick_graph/Presentation.pptx
+++ b/Graph_automization/Ball_and_stick_graph/Presentation.pptx
@@ -3483,7 +3483,28 @@
         </p:sp>
         <p:sp>
           <p:nvSpPr>
-            <p:cNvPr id="7" name="pl5"/>
+            <p:cNvPr id="7" name="rc5"/>
+            <p:cNvSpPr/>
+            <p:nvPr/>
+          </p:nvSpPr>
+          <p:spPr>
+            <a:xfrm>
+              <a:off x="2447150" y="1825625"/>
+              <a:ext cx="6573813" cy="3765197"/>
+            </a:xfrm>
+            <a:prstGeom prst="rect">
+              <a:avLst/>
+            </a:prstGeom>
+          </p:spPr>
+          <p:txBody>
+            <a:bodyPr/>
+            <a:lstStyle/>
+            <a:p/>
+          </p:txBody>
+        </p:sp>
+        <p:sp>
+          <p:nvSpPr>
+            <p:cNvPr id="8" name="pl6"/>
             <p:cNvSpPr/>
             <p:nvPr/>
           </p:nvSpPr>
@@ -3526,7 +3547,7 @@
         </p:sp>
         <p:sp>
           <p:nvSpPr>
-            <p:cNvPr id="8" name="pl6"/>
+            <p:cNvPr id="9" name="pl7"/>
             <p:cNvSpPr/>
             <p:nvPr/>
           </p:nvSpPr>
@@ -3569,7 +3590,7 @@
         </p:sp>
         <p:sp>
           <p:nvSpPr>
-            <p:cNvPr id="9" name="pl7"/>
+            <p:cNvPr id="10" name="pl8"/>
             <p:cNvSpPr/>
             <p:nvPr/>
           </p:nvSpPr>
@@ -3612,7 +3633,7 @@
         </p:sp>
         <p:sp>
           <p:nvSpPr>
-            <p:cNvPr id="10" name="pl8"/>
+            <p:cNvPr id="11" name="pl9"/>
             <p:cNvSpPr/>
             <p:nvPr/>
           </p:nvSpPr>
@@ -3655,7 +3676,7 @@
         </p:sp>
         <p:sp>
           <p:nvSpPr>
-            <p:cNvPr id="11" name="pl9"/>
+            <p:cNvPr id="12" name="pl10"/>
             <p:cNvSpPr/>
             <p:nvPr/>
           </p:nvSpPr>
@@ -3698,7 +3719,7 @@
         </p:sp>
         <p:sp>
           <p:nvSpPr>
-            <p:cNvPr id="12" name="pl10"/>
+            <p:cNvPr id="13" name="pl11"/>
             <p:cNvSpPr/>
             <p:nvPr/>
           </p:nvSpPr>
@@ -3741,7 +3762,7 @@
         </p:sp>
         <p:sp>
           <p:nvSpPr>
-            <p:cNvPr id="13" name="pl11"/>
+            <p:cNvPr id="14" name="pl12"/>
             <p:cNvSpPr/>
             <p:nvPr/>
           </p:nvSpPr>
@@ -3784,7 +3805,7 @@
         </p:sp>
         <p:sp>
           <p:nvSpPr>
-            <p:cNvPr id="14" name="pl12"/>
+            <p:cNvPr id="15" name="pl13"/>
             <p:cNvSpPr/>
             <p:nvPr/>
           </p:nvSpPr>
@@ -3827,7 +3848,7 @@
         </p:sp>
         <p:sp>
           <p:nvSpPr>
-            <p:cNvPr id="15" name="pl13"/>
+            <p:cNvPr id="16" name="pl14"/>
             <p:cNvSpPr/>
             <p:nvPr/>
           </p:nvSpPr>
@@ -3870,21 +3891,21 @@
         </p:sp>
         <p:sp>
           <p:nvSpPr>
-            <p:cNvPr id="16" name="pl14"/>
-            <p:cNvSpPr/>
-            <p:nvPr/>
-          </p:nvSpPr>
-          <p:spPr>
-            <a:xfrm>
-              <a:off x="3942663" y="5345265"/>
-              <a:ext cx="1362744" cy="0"/>
+            <p:cNvPr id="17" name="pl15"/>
+            <p:cNvSpPr/>
+            <p:nvPr/>
+          </p:nvSpPr>
+          <p:spPr>
+            <a:xfrm>
+              <a:off x="4583282" y="5345265"/>
+              <a:ext cx="1180089" cy="0"/>
             </a:xfrm>
             <a:custGeom>
               <a:avLst/>
               <a:pathLst>
-                <a:path w="1362744" h="0">
+                <a:path w="1180089" h="0">
                   <a:moveTo>
-                    <a:pt x="1362744" y="0"/>
+                    <a:pt x="1180089" y="0"/>
                   </a:moveTo>
                   <a:lnTo>
                     <a:pt x="0" y="0"/>
@@ -3910,24 +3931,24 @@
         </p:sp>
         <p:sp>
           <p:nvSpPr>
-            <p:cNvPr id="17" name="pl15"/>
-            <p:cNvSpPr/>
-            <p:nvPr/>
-          </p:nvSpPr>
-          <p:spPr>
-            <a:xfrm>
-              <a:off x="2938272" y="4936005"/>
-              <a:ext cx="2161186" cy="0"/>
+            <p:cNvPr id="18" name="pl16"/>
+            <p:cNvSpPr/>
+            <p:nvPr/>
+          </p:nvSpPr>
+          <p:spPr>
+            <a:xfrm>
+              <a:off x="3713515" y="4936005"/>
+              <a:ext cx="1871512" cy="0"/>
             </a:xfrm>
             <a:custGeom>
               <a:avLst/>
               <a:pathLst>
-                <a:path w="2161186" h="0">
+                <a:path w="1871512" h="0">
                   <a:moveTo>
                     <a:pt x="0" y="0"/>
                   </a:moveTo>
                   <a:lnTo>
-                    <a:pt x="2161186" y="0"/>
+                    <a:pt x="1871512" y="0"/>
                   </a:lnTo>
                 </a:path>
               </a:pathLst>
@@ -3950,24 +3971,24 @@
         </p:sp>
         <p:sp>
           <p:nvSpPr>
-            <p:cNvPr id="18" name="pl16"/>
-            <p:cNvSpPr/>
-            <p:nvPr/>
-          </p:nvSpPr>
-          <p:spPr>
-            <a:xfrm>
-              <a:off x="4095974" y="4526744"/>
-              <a:ext cx="622525" cy="0"/>
+            <p:cNvPr id="19" name="pl17"/>
+            <p:cNvSpPr/>
+            <p:nvPr/>
+          </p:nvSpPr>
+          <p:spPr>
+            <a:xfrm>
+              <a:off x="4716044" y="4526744"/>
+              <a:ext cx="539085" cy="0"/>
             </a:xfrm>
             <a:custGeom>
               <a:avLst/>
               <a:pathLst>
-                <a:path w="622525" h="0">
+                <a:path w="539085" h="0">
                   <a:moveTo>
                     <a:pt x="0" y="0"/>
                   </a:moveTo>
                   <a:lnTo>
-                    <a:pt x="622525" y="0"/>
+                    <a:pt x="539085" y="0"/>
                   </a:lnTo>
                 </a:path>
               </a:pathLst>
@@ -3990,24 +4011,24 @@
         </p:sp>
         <p:sp>
           <p:nvSpPr>
-            <p:cNvPr id="19" name="pl17"/>
-            <p:cNvSpPr/>
-            <p:nvPr/>
-          </p:nvSpPr>
-          <p:spPr>
-            <a:xfrm>
-              <a:off x="3740523" y="4117484"/>
-              <a:ext cx="3309713" cy="0"/>
+            <p:cNvPr id="20" name="pl18"/>
+            <p:cNvSpPr/>
+            <p:nvPr/>
+          </p:nvSpPr>
+          <p:spPr>
+            <a:xfrm>
+              <a:off x="4408236" y="4117484"/>
+              <a:ext cx="2866095" cy="0"/>
             </a:xfrm>
             <a:custGeom>
               <a:avLst/>
               <a:pathLst>
-                <a:path w="3309713" h="0">
+                <a:path w="2866095" h="0">
                   <a:moveTo>
                     <a:pt x="0" y="0"/>
                   </a:moveTo>
                   <a:lnTo>
-                    <a:pt x="3309713" y="0"/>
+                    <a:pt x="2866095" y="0"/>
                   </a:lnTo>
                 </a:path>
               </a:pathLst>
@@ -4030,21 +4051,21 @@
         </p:sp>
         <p:sp>
           <p:nvSpPr>
-            <p:cNvPr id="20" name="pl18"/>
-            <p:cNvSpPr/>
-            <p:nvPr/>
-          </p:nvSpPr>
-          <p:spPr>
-            <a:xfrm>
-              <a:off x="2745960" y="3708223"/>
-              <a:ext cx="3307180" cy="0"/>
+            <p:cNvPr id="21" name="pl19"/>
+            <p:cNvSpPr/>
+            <p:nvPr/>
+          </p:nvSpPr>
+          <p:spPr>
+            <a:xfrm>
+              <a:off x="3546979" y="3708223"/>
+              <a:ext cx="2863902" cy="0"/>
             </a:xfrm>
             <a:custGeom>
               <a:avLst/>
               <a:pathLst>
-                <a:path w="3307180" h="0">
+                <a:path w="2863902" h="0">
                   <a:moveTo>
-                    <a:pt x="3307180" y="0"/>
+                    <a:pt x="2863902" y="0"/>
                   </a:moveTo>
                   <a:lnTo>
                     <a:pt x="0" y="0"/>
@@ -4070,24 +4091,24 @@
         </p:sp>
         <p:sp>
           <p:nvSpPr>
-            <p:cNvPr id="21" name="pl19"/>
-            <p:cNvSpPr/>
-            <p:nvPr/>
-          </p:nvSpPr>
-          <p:spPr>
-            <a:xfrm>
-              <a:off x="7331294" y="3298963"/>
-              <a:ext cx="719105" cy="0"/>
+            <p:cNvPr id="22" name="pl20"/>
+            <p:cNvSpPr/>
+            <p:nvPr/>
+          </p:nvSpPr>
+          <p:spPr>
+            <a:xfrm>
+              <a:off x="7517718" y="3298963"/>
+              <a:ext cx="622720" cy="0"/>
             </a:xfrm>
             <a:custGeom>
               <a:avLst/>
               <a:pathLst>
-                <a:path w="719105" h="0">
+                <a:path w="622720" h="0">
                   <a:moveTo>
                     <a:pt x="0" y="0"/>
                   </a:moveTo>
                   <a:lnTo>
-                    <a:pt x="719105" y="0"/>
+                    <a:pt x="622720" y="0"/>
                   </a:lnTo>
                 </a:path>
               </a:pathLst>
@@ -4110,21 +4131,21 @@
         </p:sp>
         <p:sp>
           <p:nvSpPr>
-            <p:cNvPr id="22" name="pl20"/>
-            <p:cNvSpPr/>
-            <p:nvPr/>
-          </p:nvSpPr>
-          <p:spPr>
-            <a:xfrm>
-              <a:off x="4266553" y="2889702"/>
-              <a:ext cx="1508383" cy="0"/>
+            <p:cNvPr id="23" name="pl21"/>
+            <p:cNvSpPr/>
+            <p:nvPr/>
+          </p:nvSpPr>
+          <p:spPr>
+            <a:xfrm>
+              <a:off x="4863760" y="2889702"/>
+              <a:ext cx="1306207" cy="0"/>
             </a:xfrm>
             <a:custGeom>
               <a:avLst/>
               <a:pathLst>
-                <a:path w="1508383" h="0">
+                <a:path w="1306207" h="0">
                   <a:moveTo>
-                    <a:pt x="1508383" y="0"/>
+                    <a:pt x="1306207" y="0"/>
                   </a:moveTo>
                   <a:lnTo>
                     <a:pt x="0" y="0"/>
@@ -4150,21 +4171,21 @@
         </p:sp>
         <p:sp>
           <p:nvSpPr>
-            <p:cNvPr id="23" name="pl21"/>
-            <p:cNvSpPr/>
-            <p:nvPr/>
-          </p:nvSpPr>
-          <p:spPr>
-            <a:xfrm>
-              <a:off x="8403133" y="2480441"/>
-              <a:ext cx="319021" cy="0"/>
+            <p:cNvPr id="24" name="pl22"/>
+            <p:cNvSpPr/>
+            <p:nvPr/>
+          </p:nvSpPr>
+          <p:spPr>
+            <a:xfrm>
+              <a:off x="8445893" y="2480441"/>
+              <a:ext cx="276261" cy="0"/>
             </a:xfrm>
             <a:custGeom>
               <a:avLst/>
               <a:pathLst>
-                <a:path w="319021" h="0">
+                <a:path w="276261" h="0">
                   <a:moveTo>
-                    <a:pt x="319021" y="0"/>
+                    <a:pt x="276261" y="0"/>
                   </a:moveTo>
                   <a:lnTo>
                     <a:pt x="0" y="0"/>
@@ -4190,21 +4211,21 @@
         </p:sp>
         <p:sp>
           <p:nvSpPr>
-            <p:cNvPr id="24" name="pl22"/>
-            <p:cNvSpPr/>
-            <p:nvPr/>
-          </p:nvSpPr>
-          <p:spPr>
-            <a:xfrm>
-              <a:off x="6175448" y="2071181"/>
-              <a:ext cx="642257" cy="0"/>
+            <p:cNvPr id="25" name="pl23"/>
+            <p:cNvSpPr/>
+            <p:nvPr/>
+          </p:nvSpPr>
+          <p:spPr>
+            <a:xfrm>
+              <a:off x="6516796" y="2071181"/>
+              <a:ext cx="556172" cy="0"/>
             </a:xfrm>
             <a:custGeom>
               <a:avLst/>
               <a:pathLst>
-                <a:path w="642257" h="0">
+                <a:path w="556172" h="0">
                   <a:moveTo>
-                    <a:pt x="642257" y="0"/>
+                    <a:pt x="556172" y="0"/>
                   </a:moveTo>
                   <a:lnTo>
                     <a:pt x="0" y="0"/>
@@ -4230,949 +4251,13 @@
         </p:sp>
         <p:sp>
           <p:nvSpPr>
-            <p:cNvPr id="25" name="pt23"/>
-            <p:cNvSpPr/>
-            <p:nvPr/>
-          </p:nvSpPr>
-          <p:spPr>
-            <a:xfrm>
-              <a:off x="5236340" y="5276198"/>
-              <a:ext cx="138135" cy="138135"/>
-            </a:xfrm>
-            <a:prstGeom prst="ellipse">
-              <a:avLst/>
-            </a:prstGeom>
-            <a:solidFill>
-              <a:srgbClr val="000000">
-                <a:alpha val="100000"/>
-              </a:srgbClr>
-            </a:solidFill>
-            <a:ln w="21600" cap="rnd">
-              <a:solidFill>
-                <a:srgbClr val="000000">
-                  <a:alpha val="100000"/>
-                </a:srgbClr>
-              </a:solidFill>
-              <a:prstDash val="solid"/>
-              <a:round/>
-            </a:ln>
-          </p:spPr>
-          <p:txBody>
-            <a:bodyPr/>
-            <a:lstStyle/>
-            <a:p/>
-          </p:txBody>
-        </p:sp>
-        <p:sp>
-          <p:nvSpPr>
-            <p:cNvPr id="26" name="pt24"/>
-            <p:cNvSpPr/>
-            <p:nvPr/>
-          </p:nvSpPr>
-          <p:spPr>
-            <a:xfrm>
-              <a:off x="3873595" y="5276198"/>
-              <a:ext cx="138135" cy="138135"/>
-            </a:xfrm>
-            <a:prstGeom prst="ellipse">
-              <a:avLst/>
-            </a:prstGeom>
-            <a:solidFill>
-              <a:srgbClr val="FFFFFF">
-                <a:alpha val="100000"/>
-              </a:srgbClr>
-            </a:solidFill>
-            <a:ln w="21600" cap="rnd">
-              <a:solidFill>
-                <a:srgbClr val="000000">
-                  <a:alpha val="100000"/>
-                </a:srgbClr>
-              </a:solidFill>
-              <a:prstDash val="solid"/>
-              <a:round/>
-            </a:ln>
-          </p:spPr>
-          <p:txBody>
-            <a:bodyPr/>
-            <a:lstStyle/>
-            <a:p/>
-          </p:txBody>
-        </p:sp>
-        <p:sp>
-          <p:nvSpPr>
-            <p:cNvPr id="27" name="pt25"/>
-            <p:cNvSpPr/>
-            <p:nvPr/>
-          </p:nvSpPr>
-          <p:spPr>
-            <a:xfrm>
-              <a:off x="5984073" y="3639155"/>
-              <a:ext cx="138135" cy="138135"/>
-            </a:xfrm>
-            <a:prstGeom prst="ellipse">
-              <a:avLst/>
-            </a:prstGeom>
-            <a:solidFill>
-              <a:srgbClr val="000000">
-                <a:alpha val="100000"/>
-              </a:srgbClr>
-            </a:solidFill>
-            <a:ln w="21600" cap="rnd">
-              <a:solidFill>
-                <a:srgbClr val="000000">
-                  <a:alpha val="100000"/>
-                </a:srgbClr>
-              </a:solidFill>
-              <a:prstDash val="solid"/>
-              <a:round/>
-            </a:ln>
-          </p:spPr>
-          <p:txBody>
-            <a:bodyPr/>
-            <a:lstStyle/>
-            <a:p/>
-          </p:txBody>
-        </p:sp>
-        <p:sp>
-          <p:nvSpPr>
-            <p:cNvPr id="28" name="pt26"/>
-            <p:cNvSpPr/>
-            <p:nvPr/>
-          </p:nvSpPr>
-          <p:spPr>
-            <a:xfrm>
-              <a:off x="2676892" y="3639155"/>
-              <a:ext cx="138135" cy="138135"/>
-            </a:xfrm>
-            <a:prstGeom prst="ellipse">
-              <a:avLst/>
-            </a:prstGeom>
-            <a:solidFill>
-              <a:srgbClr val="FFFFFF">
-                <a:alpha val="100000"/>
-              </a:srgbClr>
-            </a:solidFill>
-            <a:ln w="21600" cap="rnd">
-              <a:solidFill>
-                <a:srgbClr val="000000">
-                  <a:alpha val="100000"/>
-                </a:srgbClr>
-              </a:solidFill>
-              <a:prstDash val="solid"/>
-              <a:round/>
-            </a:ln>
-          </p:spPr>
-          <p:txBody>
-            <a:bodyPr/>
-            <a:lstStyle/>
-            <a:p/>
-          </p:txBody>
-        </p:sp>
-        <p:sp>
-          <p:nvSpPr>
-            <p:cNvPr id="29" name="pt27"/>
-            <p:cNvSpPr/>
-            <p:nvPr/>
-          </p:nvSpPr>
-          <p:spPr>
-            <a:xfrm>
-              <a:off x="5705869" y="2820634"/>
-              <a:ext cx="138135" cy="138135"/>
-            </a:xfrm>
-            <a:prstGeom prst="ellipse">
-              <a:avLst/>
-            </a:prstGeom>
-            <a:solidFill>
-              <a:srgbClr val="000000">
-                <a:alpha val="100000"/>
-              </a:srgbClr>
-            </a:solidFill>
-            <a:ln w="21600" cap="rnd">
-              <a:solidFill>
-                <a:srgbClr val="000000">
-                  <a:alpha val="100000"/>
-                </a:srgbClr>
-              </a:solidFill>
-              <a:prstDash val="solid"/>
-              <a:round/>
-            </a:ln>
-          </p:spPr>
-          <p:txBody>
-            <a:bodyPr/>
-            <a:lstStyle/>
-            <a:p/>
-          </p:txBody>
-        </p:sp>
-        <p:sp>
-          <p:nvSpPr>
-            <p:cNvPr id="30" name="pt28"/>
-            <p:cNvSpPr/>
-            <p:nvPr/>
-          </p:nvSpPr>
-          <p:spPr>
-            <a:xfrm>
-              <a:off x="4197485" y="2820634"/>
-              <a:ext cx="138135" cy="138135"/>
-            </a:xfrm>
-            <a:prstGeom prst="ellipse">
-              <a:avLst/>
-            </a:prstGeom>
-            <a:solidFill>
-              <a:srgbClr val="FFFFFF">
-                <a:alpha val="100000"/>
-              </a:srgbClr>
-            </a:solidFill>
-            <a:ln w="21600" cap="rnd">
-              <a:solidFill>
-                <a:srgbClr val="000000">
-                  <a:alpha val="100000"/>
-                </a:srgbClr>
-              </a:solidFill>
-              <a:prstDash val="solid"/>
-              <a:round/>
-            </a:ln>
-          </p:spPr>
-          <p:txBody>
-            <a:bodyPr/>
-            <a:lstStyle/>
-            <a:p/>
-          </p:txBody>
-        </p:sp>
-        <p:sp>
-          <p:nvSpPr>
-            <p:cNvPr id="31" name="pt29"/>
-            <p:cNvSpPr/>
-            <p:nvPr/>
-          </p:nvSpPr>
-          <p:spPr>
-            <a:xfrm>
-              <a:off x="8653087" y="2411374"/>
-              <a:ext cx="138135" cy="138135"/>
-            </a:xfrm>
-            <a:prstGeom prst="ellipse">
-              <a:avLst/>
-            </a:prstGeom>
-            <a:solidFill>
-              <a:srgbClr val="000000">
-                <a:alpha val="100000"/>
-              </a:srgbClr>
-            </a:solidFill>
-            <a:ln w="21600" cap="rnd">
-              <a:solidFill>
-                <a:srgbClr val="000000">
-                  <a:alpha val="100000"/>
-                </a:srgbClr>
-              </a:solidFill>
-              <a:prstDash val="solid"/>
-              <a:round/>
-            </a:ln>
-          </p:spPr>
-          <p:txBody>
-            <a:bodyPr/>
-            <a:lstStyle/>
-            <a:p/>
-          </p:txBody>
-        </p:sp>
-        <p:sp>
-          <p:nvSpPr>
-            <p:cNvPr id="32" name="pt30"/>
-            <p:cNvSpPr/>
-            <p:nvPr/>
-          </p:nvSpPr>
-          <p:spPr>
-            <a:xfrm>
-              <a:off x="8334065" y="2411374"/>
-              <a:ext cx="138135" cy="138135"/>
-            </a:xfrm>
-            <a:prstGeom prst="ellipse">
-              <a:avLst/>
-            </a:prstGeom>
-            <a:solidFill>
-              <a:srgbClr val="FFFFFF">
-                <a:alpha val="100000"/>
-              </a:srgbClr>
-            </a:solidFill>
-            <a:ln w="21600" cap="rnd">
-              <a:solidFill>
-                <a:srgbClr val="000000">
-                  <a:alpha val="100000"/>
-                </a:srgbClr>
-              </a:solidFill>
-              <a:prstDash val="solid"/>
-              <a:round/>
-            </a:ln>
-          </p:spPr>
-          <p:txBody>
-            <a:bodyPr/>
-            <a:lstStyle/>
-            <a:p/>
-          </p:txBody>
-        </p:sp>
-        <p:sp>
-          <p:nvSpPr>
-            <p:cNvPr id="33" name="pt31"/>
-            <p:cNvSpPr/>
-            <p:nvPr/>
-          </p:nvSpPr>
-          <p:spPr>
-            <a:xfrm>
-              <a:off x="6748638" y="2002113"/>
-              <a:ext cx="138135" cy="138135"/>
-            </a:xfrm>
-            <a:prstGeom prst="ellipse">
-              <a:avLst/>
-            </a:prstGeom>
-            <a:solidFill>
-              <a:srgbClr val="000000">
-                <a:alpha val="100000"/>
-              </a:srgbClr>
-            </a:solidFill>
-            <a:ln w="21600" cap="rnd">
-              <a:solidFill>
-                <a:srgbClr val="000000">
-                  <a:alpha val="100000"/>
-                </a:srgbClr>
-              </a:solidFill>
-              <a:prstDash val="solid"/>
-              <a:round/>
-            </a:ln>
-          </p:spPr>
-          <p:txBody>
-            <a:bodyPr/>
-            <a:lstStyle/>
-            <a:p/>
-          </p:txBody>
-        </p:sp>
-        <p:sp>
-          <p:nvSpPr>
-            <p:cNvPr id="34" name="pt32"/>
-            <p:cNvSpPr/>
-            <p:nvPr/>
-          </p:nvSpPr>
-          <p:spPr>
-            <a:xfrm>
-              <a:off x="6106381" y="2002113"/>
-              <a:ext cx="138135" cy="138135"/>
-            </a:xfrm>
-            <a:prstGeom prst="ellipse">
-              <a:avLst/>
-            </a:prstGeom>
-            <a:solidFill>
-              <a:srgbClr val="FFFFFF">
-                <a:alpha val="100000"/>
-              </a:srgbClr>
-            </a:solidFill>
-            <a:ln w="21600" cap="rnd">
-              <a:solidFill>
-                <a:srgbClr val="000000">
-                  <a:alpha val="100000"/>
-                </a:srgbClr>
-              </a:solidFill>
-              <a:prstDash val="solid"/>
-              <a:round/>
-            </a:ln>
-          </p:spPr>
-          <p:txBody>
-            <a:bodyPr/>
-            <a:lstStyle/>
-            <a:p/>
-          </p:txBody>
-        </p:sp>
-        <p:sp>
-          <p:nvSpPr>
-            <p:cNvPr id="35" name="pt33"/>
-            <p:cNvSpPr/>
-            <p:nvPr/>
-          </p:nvSpPr>
-          <p:spPr>
-            <a:xfrm>
-              <a:off x="4026906" y="4457677"/>
-              <a:ext cx="138135" cy="138135"/>
-            </a:xfrm>
-            <a:prstGeom prst="ellipse">
-              <a:avLst/>
-            </a:prstGeom>
-            <a:solidFill>
-              <a:srgbClr val="000000">
-                <a:alpha val="100000"/>
-              </a:srgbClr>
-            </a:solidFill>
-            <a:ln w="21600" cap="rnd">
-              <a:solidFill>
-                <a:srgbClr val="000000">
-                  <a:alpha val="100000"/>
-                </a:srgbClr>
-              </a:solidFill>
-              <a:prstDash val="solid"/>
-              <a:round/>
-            </a:ln>
-          </p:spPr>
-          <p:txBody>
-            <a:bodyPr/>
-            <a:lstStyle/>
-            <a:p/>
-          </p:txBody>
-        </p:sp>
-        <p:sp>
-          <p:nvSpPr>
-            <p:cNvPr id="36" name="pt34"/>
-            <p:cNvSpPr/>
-            <p:nvPr/>
-          </p:nvSpPr>
-          <p:spPr>
-            <a:xfrm>
-              <a:off x="4649432" y="4457677"/>
-              <a:ext cx="138135" cy="138135"/>
-            </a:xfrm>
-            <a:prstGeom prst="ellipse">
-              <a:avLst/>
-            </a:prstGeom>
-            <a:solidFill>
-              <a:srgbClr val="FFFFFF">
-                <a:alpha val="100000"/>
-              </a:srgbClr>
-            </a:solidFill>
-            <a:ln w="21600" cap="rnd">
-              <a:solidFill>
-                <a:srgbClr val="000000">
-                  <a:alpha val="100000"/>
-                </a:srgbClr>
-              </a:solidFill>
-              <a:prstDash val="solid"/>
-              <a:round/>
-            </a:ln>
-          </p:spPr>
-          <p:txBody>
-            <a:bodyPr/>
-            <a:lstStyle/>
-            <a:p/>
-          </p:txBody>
-        </p:sp>
-        <p:sp>
-          <p:nvSpPr>
-            <p:cNvPr id="37" name="pt35"/>
-            <p:cNvSpPr/>
-            <p:nvPr/>
-          </p:nvSpPr>
-          <p:spPr>
-            <a:xfrm>
-              <a:off x="3671455" y="4048416"/>
-              <a:ext cx="138135" cy="138135"/>
-            </a:xfrm>
-            <a:prstGeom prst="ellipse">
-              <a:avLst/>
-            </a:prstGeom>
-            <a:solidFill>
-              <a:srgbClr val="000000">
-                <a:alpha val="100000"/>
-              </a:srgbClr>
-            </a:solidFill>
-            <a:ln w="21600" cap="rnd">
-              <a:solidFill>
-                <a:srgbClr val="000000">
-                  <a:alpha val="100000"/>
-                </a:srgbClr>
-              </a:solidFill>
-              <a:prstDash val="solid"/>
-              <a:round/>
-            </a:ln>
-          </p:spPr>
-          <p:txBody>
-            <a:bodyPr/>
-            <a:lstStyle/>
-            <a:p/>
-          </p:txBody>
-        </p:sp>
-        <p:sp>
-          <p:nvSpPr>
-            <p:cNvPr id="38" name="pt36"/>
-            <p:cNvSpPr/>
-            <p:nvPr/>
-          </p:nvSpPr>
-          <p:spPr>
-            <a:xfrm>
-              <a:off x="6981168" y="4048416"/>
-              <a:ext cx="138135" cy="138135"/>
-            </a:xfrm>
-            <a:prstGeom prst="ellipse">
-              <a:avLst/>
-            </a:prstGeom>
-            <a:solidFill>
-              <a:srgbClr val="FFFFFF">
-                <a:alpha val="100000"/>
-              </a:srgbClr>
-            </a:solidFill>
-            <a:ln w="21600" cap="rnd">
-              <a:solidFill>
-                <a:srgbClr val="000000">
-                  <a:alpha val="100000"/>
-                </a:srgbClr>
-              </a:solidFill>
-              <a:prstDash val="solid"/>
-              <a:round/>
-            </a:ln>
-          </p:spPr>
-          <p:txBody>
-            <a:bodyPr/>
-            <a:lstStyle/>
-            <a:p/>
-          </p:txBody>
-        </p:sp>
-        <p:sp>
-          <p:nvSpPr>
-            <p:cNvPr id="39" name="pt37"/>
-            <p:cNvSpPr/>
-            <p:nvPr/>
-          </p:nvSpPr>
-          <p:spPr>
-            <a:xfrm>
-              <a:off x="7262227" y="3229895"/>
-              <a:ext cx="138135" cy="138135"/>
-            </a:xfrm>
-            <a:prstGeom prst="ellipse">
-              <a:avLst/>
-            </a:prstGeom>
-            <a:solidFill>
-              <a:srgbClr val="000000">
-                <a:alpha val="100000"/>
-              </a:srgbClr>
-            </a:solidFill>
-            <a:ln w="21600" cap="rnd">
-              <a:solidFill>
-                <a:srgbClr val="000000">
-                  <a:alpha val="100000"/>
-                </a:srgbClr>
-              </a:solidFill>
-              <a:prstDash val="solid"/>
-              <a:round/>
-            </a:ln>
-          </p:spPr>
-          <p:txBody>
-            <a:bodyPr/>
-            <a:lstStyle/>
-            <a:p/>
-          </p:txBody>
-        </p:sp>
-        <p:sp>
-          <p:nvSpPr>
-            <p:cNvPr id="40" name="pt38"/>
-            <p:cNvSpPr/>
-            <p:nvPr/>
-          </p:nvSpPr>
-          <p:spPr>
-            <a:xfrm>
-              <a:off x="7981333" y="3229895"/>
-              <a:ext cx="138135" cy="138135"/>
-            </a:xfrm>
-            <a:prstGeom prst="ellipse">
-              <a:avLst/>
-            </a:prstGeom>
-            <a:solidFill>
-              <a:srgbClr val="FFFFFF">
-                <a:alpha val="100000"/>
-              </a:srgbClr>
-            </a:solidFill>
-            <a:ln w="21600" cap="rnd">
-              <a:solidFill>
-                <a:srgbClr val="000000">
-                  <a:alpha val="100000"/>
-                </a:srgbClr>
-              </a:solidFill>
-              <a:prstDash val="solid"/>
-              <a:round/>
-            </a:ln>
-          </p:spPr>
-          <p:txBody>
-            <a:bodyPr/>
-            <a:lstStyle/>
-            <a:p/>
-          </p:txBody>
-        </p:sp>
-        <p:sp>
-          <p:nvSpPr>
-            <p:cNvPr id="41" name="pt39"/>
-            <p:cNvSpPr/>
-            <p:nvPr/>
-          </p:nvSpPr>
-          <p:spPr>
-            <a:xfrm>
-              <a:off x="2869205" y="4866937"/>
-              <a:ext cx="138135" cy="138135"/>
-            </a:xfrm>
-            <a:prstGeom prst="ellipse">
-              <a:avLst/>
-            </a:prstGeom>
-            <a:solidFill>
-              <a:srgbClr val="000000">
-                <a:alpha val="100000"/>
-              </a:srgbClr>
-            </a:solidFill>
-            <a:ln w="21600" cap="rnd">
-              <a:solidFill>
-                <a:srgbClr val="000000">
-                  <a:alpha val="100000"/>
-                </a:srgbClr>
-              </a:solidFill>
-              <a:prstDash val="solid"/>
-              <a:round/>
-            </a:ln>
-          </p:spPr>
-          <p:txBody>
-            <a:bodyPr/>
-            <a:lstStyle/>
-            <a:p/>
-          </p:txBody>
-        </p:sp>
-        <p:sp>
-          <p:nvSpPr>
-            <p:cNvPr id="42" name="pt40"/>
-            <p:cNvSpPr/>
-            <p:nvPr/>
-          </p:nvSpPr>
-          <p:spPr>
-            <a:xfrm>
-              <a:off x="5030392" y="4866937"/>
-              <a:ext cx="138135" cy="138135"/>
-            </a:xfrm>
-            <a:prstGeom prst="ellipse">
-              <a:avLst/>
-            </a:prstGeom>
-            <a:solidFill>
-              <a:srgbClr val="FFFFFF">
-                <a:alpha val="100000"/>
-              </a:srgbClr>
-            </a:solidFill>
-            <a:ln w="21600" cap="rnd">
-              <a:solidFill>
-                <a:srgbClr val="000000">
-                  <a:alpha val="100000"/>
-                </a:srgbClr>
-              </a:solidFill>
-              <a:prstDash val="solid"/>
-              <a:round/>
-            </a:ln>
-          </p:spPr>
-          <p:txBody>
-            <a:bodyPr/>
-            <a:lstStyle/>
-            <a:p/>
-          </p:txBody>
-        </p:sp>
-        <p:sp>
-          <p:nvSpPr>
-            <p:cNvPr id="43" name="pl41"/>
-            <p:cNvSpPr/>
-            <p:nvPr/>
-          </p:nvSpPr>
-          <p:spPr>
-            <a:xfrm>
-              <a:off x="2447150" y="5345265"/>
-              <a:ext cx="6573813" cy="0"/>
-            </a:xfrm>
-            <a:custGeom>
-              <a:avLst/>
-              <a:pathLst>
-                <a:path w="6573813" h="0">
-                  <a:moveTo>
-                    <a:pt x="0" y="0"/>
-                  </a:moveTo>
-                  <a:lnTo>
-                    <a:pt x="6573813" y="0"/>
-                  </a:lnTo>
-                  <a:lnTo>
-                    <a:pt x="6573813" y="0"/>
-                  </a:lnTo>
-                </a:path>
-              </a:pathLst>
-            </a:custGeom>
-          </p:spPr>
-          <p:txBody>
-            <a:bodyPr/>
-            <a:lstStyle/>
-            <a:p/>
-          </p:txBody>
-        </p:sp>
-        <p:sp>
-          <p:nvSpPr>
-            <p:cNvPr id="44" name="pl42"/>
-            <p:cNvSpPr/>
-            <p:nvPr/>
-          </p:nvSpPr>
-          <p:spPr>
-            <a:xfrm>
-              <a:off x="2447150" y="4936005"/>
-              <a:ext cx="6573813" cy="0"/>
-            </a:xfrm>
-            <a:custGeom>
-              <a:avLst/>
-              <a:pathLst>
-                <a:path w="6573813" h="0">
-                  <a:moveTo>
-                    <a:pt x="0" y="0"/>
-                  </a:moveTo>
-                  <a:lnTo>
-                    <a:pt x="6573813" y="0"/>
-                  </a:lnTo>
-                  <a:lnTo>
-                    <a:pt x="6573813" y="0"/>
-                  </a:lnTo>
-                </a:path>
-              </a:pathLst>
-            </a:custGeom>
-          </p:spPr>
-          <p:txBody>
-            <a:bodyPr/>
-            <a:lstStyle/>
-            <a:p/>
-          </p:txBody>
-        </p:sp>
-        <p:sp>
-          <p:nvSpPr>
-            <p:cNvPr id="45" name="pl43"/>
-            <p:cNvSpPr/>
-            <p:nvPr/>
-          </p:nvSpPr>
-          <p:spPr>
-            <a:xfrm>
-              <a:off x="2447150" y="4526744"/>
-              <a:ext cx="6573813" cy="0"/>
-            </a:xfrm>
-            <a:custGeom>
-              <a:avLst/>
-              <a:pathLst>
-                <a:path w="6573813" h="0">
-                  <a:moveTo>
-                    <a:pt x="0" y="0"/>
-                  </a:moveTo>
-                  <a:lnTo>
-                    <a:pt x="6573813" y="0"/>
-                  </a:lnTo>
-                  <a:lnTo>
-                    <a:pt x="6573813" y="0"/>
-                  </a:lnTo>
-                </a:path>
-              </a:pathLst>
-            </a:custGeom>
-          </p:spPr>
-          <p:txBody>
-            <a:bodyPr/>
-            <a:lstStyle/>
-            <a:p/>
-          </p:txBody>
-        </p:sp>
-        <p:sp>
-          <p:nvSpPr>
-            <p:cNvPr id="46" name="pl44"/>
-            <p:cNvSpPr/>
-            <p:nvPr/>
-          </p:nvSpPr>
-          <p:spPr>
-            <a:xfrm>
-              <a:off x="2447150" y="4117484"/>
-              <a:ext cx="6573813" cy="0"/>
-            </a:xfrm>
-            <a:custGeom>
-              <a:avLst/>
-              <a:pathLst>
-                <a:path w="6573813" h="0">
-                  <a:moveTo>
-                    <a:pt x="0" y="0"/>
-                  </a:moveTo>
-                  <a:lnTo>
-                    <a:pt x="6573813" y="0"/>
-                  </a:lnTo>
-                  <a:lnTo>
-                    <a:pt x="6573813" y="0"/>
-                  </a:lnTo>
-                </a:path>
-              </a:pathLst>
-            </a:custGeom>
-          </p:spPr>
-          <p:txBody>
-            <a:bodyPr/>
-            <a:lstStyle/>
-            <a:p/>
-          </p:txBody>
-        </p:sp>
-        <p:sp>
-          <p:nvSpPr>
-            <p:cNvPr id="47" name="pl45"/>
-            <p:cNvSpPr/>
-            <p:nvPr/>
-          </p:nvSpPr>
-          <p:spPr>
-            <a:xfrm>
-              <a:off x="2447150" y="3708223"/>
-              <a:ext cx="6573813" cy="0"/>
-            </a:xfrm>
-            <a:custGeom>
-              <a:avLst/>
-              <a:pathLst>
-                <a:path w="6573813" h="0">
-                  <a:moveTo>
-                    <a:pt x="0" y="0"/>
-                  </a:moveTo>
-                  <a:lnTo>
-                    <a:pt x="6573813" y="0"/>
-                  </a:lnTo>
-                  <a:lnTo>
-                    <a:pt x="6573813" y="0"/>
-                  </a:lnTo>
-                </a:path>
-              </a:pathLst>
-            </a:custGeom>
-          </p:spPr>
-          <p:txBody>
-            <a:bodyPr/>
-            <a:lstStyle/>
-            <a:p/>
-          </p:txBody>
-        </p:sp>
-        <p:sp>
-          <p:nvSpPr>
-            <p:cNvPr id="48" name="pl46"/>
-            <p:cNvSpPr/>
-            <p:nvPr/>
-          </p:nvSpPr>
-          <p:spPr>
-            <a:xfrm>
-              <a:off x="2447150" y="3298963"/>
-              <a:ext cx="6573813" cy="0"/>
-            </a:xfrm>
-            <a:custGeom>
-              <a:avLst/>
-              <a:pathLst>
-                <a:path w="6573813" h="0">
-                  <a:moveTo>
-                    <a:pt x="0" y="0"/>
-                  </a:moveTo>
-                  <a:lnTo>
-                    <a:pt x="6573813" y="0"/>
-                  </a:lnTo>
-                  <a:lnTo>
-                    <a:pt x="6573813" y="0"/>
-                  </a:lnTo>
-                </a:path>
-              </a:pathLst>
-            </a:custGeom>
-          </p:spPr>
-          <p:txBody>
-            <a:bodyPr/>
-            <a:lstStyle/>
-            <a:p/>
-          </p:txBody>
-        </p:sp>
-        <p:sp>
-          <p:nvSpPr>
-            <p:cNvPr id="49" name="pl47"/>
-            <p:cNvSpPr/>
-            <p:nvPr/>
-          </p:nvSpPr>
-          <p:spPr>
-            <a:xfrm>
-              <a:off x="2447150" y="2889702"/>
-              <a:ext cx="6573813" cy="0"/>
-            </a:xfrm>
-            <a:custGeom>
-              <a:avLst/>
-              <a:pathLst>
-                <a:path w="6573813" h="0">
-                  <a:moveTo>
-                    <a:pt x="0" y="0"/>
-                  </a:moveTo>
-                  <a:lnTo>
-                    <a:pt x="6573813" y="0"/>
-                  </a:lnTo>
-                  <a:lnTo>
-                    <a:pt x="6573813" y="0"/>
-                  </a:lnTo>
-                </a:path>
-              </a:pathLst>
-            </a:custGeom>
-          </p:spPr>
-          <p:txBody>
-            <a:bodyPr/>
-            <a:lstStyle/>
-            <a:p/>
-          </p:txBody>
-        </p:sp>
-        <p:sp>
-          <p:nvSpPr>
-            <p:cNvPr id="50" name="pl48"/>
-            <p:cNvSpPr/>
-            <p:nvPr/>
-          </p:nvSpPr>
-          <p:spPr>
-            <a:xfrm>
-              <a:off x="2447150" y="2480441"/>
-              <a:ext cx="6573813" cy="0"/>
-            </a:xfrm>
-            <a:custGeom>
-              <a:avLst/>
-              <a:pathLst>
-                <a:path w="6573813" h="0">
-                  <a:moveTo>
-                    <a:pt x="0" y="0"/>
-                  </a:moveTo>
-                  <a:lnTo>
-                    <a:pt x="6573813" y="0"/>
-                  </a:lnTo>
-                  <a:lnTo>
-                    <a:pt x="6573813" y="0"/>
-                  </a:lnTo>
-                </a:path>
-              </a:pathLst>
-            </a:custGeom>
-          </p:spPr>
-          <p:txBody>
-            <a:bodyPr/>
-            <a:lstStyle/>
-            <a:p/>
-          </p:txBody>
-        </p:sp>
-        <p:sp>
-          <p:nvSpPr>
-            <p:cNvPr id="51" name="pl49"/>
-            <p:cNvSpPr/>
-            <p:nvPr/>
-          </p:nvSpPr>
-          <p:spPr>
-            <a:xfrm>
-              <a:off x="2447150" y="2071181"/>
-              <a:ext cx="6573813" cy="0"/>
-            </a:xfrm>
-            <a:custGeom>
-              <a:avLst/>
-              <a:pathLst>
-                <a:path w="6573813" h="0">
-                  <a:moveTo>
-                    <a:pt x="0" y="0"/>
-                  </a:moveTo>
-                  <a:lnTo>
-                    <a:pt x="6573813" y="0"/>
-                  </a:lnTo>
-                  <a:lnTo>
-                    <a:pt x="6573813" y="0"/>
-                  </a:lnTo>
-                </a:path>
-              </a:pathLst>
-            </a:custGeom>
-          </p:spPr>
-          <p:txBody>
-            <a:bodyPr/>
-            <a:lstStyle/>
-            <a:p/>
-          </p:txBody>
-        </p:sp>
-        <p:sp>
-          <p:nvSpPr>
-            <p:cNvPr id="52" name="pl50"/>
-            <p:cNvSpPr/>
-            <p:nvPr/>
-          </p:nvSpPr>
-          <p:spPr>
-            <a:xfrm>
-              <a:off x="2570083" y="1825625"/>
+            <p:cNvPr id="26" name="pl24"/>
+            <p:cNvSpPr/>
+            <p:nvPr/>
+          </p:nvSpPr>
+          <p:spPr>
+            <a:xfrm>
+              <a:off x="2745960" y="1825625"/>
               <a:ext cx="0" cy="3765197"/>
             </a:xfrm>
             <a:custGeom>
@@ -5206,13 +4291,13 @@
         </p:sp>
         <p:sp>
           <p:nvSpPr>
-            <p:cNvPr id="53" name="pl51"/>
-            <p:cNvSpPr/>
-            <p:nvPr/>
-          </p:nvSpPr>
-          <p:spPr>
-            <a:xfrm>
-              <a:off x="3319208" y="1825625"/>
+            <p:cNvPr id="27" name="pl25"/>
+            <p:cNvSpPr/>
+            <p:nvPr/>
+          </p:nvSpPr>
+          <p:spPr>
+            <a:xfrm>
+              <a:off x="3394676" y="1825625"/>
               <a:ext cx="0" cy="3765197"/>
             </a:xfrm>
             <a:custGeom>
@@ -5246,13 +4331,13 @@
         </p:sp>
         <p:sp>
           <p:nvSpPr>
-            <p:cNvPr id="54" name="pl52"/>
-            <p:cNvSpPr/>
-            <p:nvPr/>
-          </p:nvSpPr>
-          <p:spPr>
-            <a:xfrm>
-              <a:off x="4068333" y="1825625"/>
+            <p:cNvPr id="28" name="pl26"/>
+            <p:cNvSpPr/>
+            <p:nvPr/>
+          </p:nvSpPr>
+          <p:spPr>
+            <a:xfrm>
+              <a:off x="4043392" y="1825625"/>
               <a:ext cx="0" cy="3765197"/>
             </a:xfrm>
             <a:custGeom>
@@ -5286,13 +4371,13 @@
         </p:sp>
         <p:sp>
           <p:nvSpPr>
-            <p:cNvPr id="55" name="pl53"/>
-            <p:cNvSpPr/>
-            <p:nvPr/>
-          </p:nvSpPr>
-          <p:spPr>
-            <a:xfrm>
-              <a:off x="4817457" y="1825625"/>
+            <p:cNvPr id="29" name="pl27"/>
+            <p:cNvSpPr/>
+            <p:nvPr/>
+          </p:nvSpPr>
+          <p:spPr>
+            <a:xfrm>
+              <a:off x="4692108" y="1825625"/>
               <a:ext cx="0" cy="3765197"/>
             </a:xfrm>
             <a:custGeom>
@@ -5326,13 +4411,13 @@
         </p:sp>
         <p:sp>
           <p:nvSpPr>
-            <p:cNvPr id="56" name="pl54"/>
-            <p:cNvSpPr/>
-            <p:nvPr/>
-          </p:nvSpPr>
-          <p:spPr>
-            <a:xfrm>
-              <a:off x="5566582" y="1825625"/>
+            <p:cNvPr id="30" name="pl28"/>
+            <p:cNvSpPr/>
+            <p:nvPr/>
+          </p:nvSpPr>
+          <p:spPr>
+            <a:xfrm>
+              <a:off x="5340823" y="1825625"/>
               <a:ext cx="0" cy="3765197"/>
             </a:xfrm>
             <a:custGeom>
@@ -5366,13 +4451,13 @@
         </p:sp>
         <p:sp>
           <p:nvSpPr>
-            <p:cNvPr id="57" name="pl55"/>
-            <p:cNvSpPr/>
-            <p:nvPr/>
-          </p:nvSpPr>
-          <p:spPr>
-            <a:xfrm>
-              <a:off x="6315707" y="1825625"/>
+            <p:cNvPr id="31" name="pl29"/>
+            <p:cNvSpPr/>
+            <p:nvPr/>
+          </p:nvSpPr>
+          <p:spPr>
+            <a:xfrm>
+              <a:off x="5989539" y="1825625"/>
               <a:ext cx="0" cy="3765197"/>
             </a:xfrm>
             <a:custGeom>
@@ -5406,13 +4491,13 @@
         </p:sp>
         <p:sp>
           <p:nvSpPr>
-            <p:cNvPr id="58" name="pl56"/>
-            <p:cNvSpPr/>
-            <p:nvPr/>
-          </p:nvSpPr>
-          <p:spPr>
-            <a:xfrm>
-              <a:off x="7064832" y="1825625"/>
+            <p:cNvPr id="32" name="pl30"/>
+            <p:cNvSpPr/>
+            <p:nvPr/>
+          </p:nvSpPr>
+          <p:spPr>
+            <a:xfrm>
+              <a:off x="6638255" y="1825625"/>
               <a:ext cx="0" cy="3765197"/>
             </a:xfrm>
             <a:custGeom>
@@ -5446,13 +4531,13 @@
         </p:sp>
         <p:sp>
           <p:nvSpPr>
-            <p:cNvPr id="59" name="pl57"/>
-            <p:cNvSpPr/>
-            <p:nvPr/>
-          </p:nvSpPr>
-          <p:spPr>
-            <a:xfrm>
-              <a:off x="7813957" y="1825625"/>
+            <p:cNvPr id="33" name="pl31"/>
+            <p:cNvSpPr/>
+            <p:nvPr/>
+          </p:nvSpPr>
+          <p:spPr>
+            <a:xfrm>
+              <a:off x="7286971" y="1825625"/>
               <a:ext cx="0" cy="3765197"/>
             </a:xfrm>
             <a:custGeom>
@@ -5486,13 +4571,13 @@
         </p:sp>
         <p:sp>
           <p:nvSpPr>
-            <p:cNvPr id="60" name="pl58"/>
-            <p:cNvSpPr/>
-            <p:nvPr/>
-          </p:nvSpPr>
-          <p:spPr>
-            <a:xfrm>
-              <a:off x="8563082" y="1825625"/>
+            <p:cNvPr id="34" name="pl32"/>
+            <p:cNvSpPr/>
+            <p:nvPr/>
+          </p:nvSpPr>
+          <p:spPr>
+            <a:xfrm>
+              <a:off x="7935687" y="1825625"/>
               <a:ext cx="0" cy="3765197"/>
             </a:xfrm>
             <a:custGeom>
@@ -5526,7 +4611,677 @@
         </p:sp>
         <p:sp>
           <p:nvSpPr>
-            <p:cNvPr id="61" name="tx59"/>
+            <p:cNvPr id="35" name="pl33"/>
+            <p:cNvSpPr/>
+            <p:nvPr/>
+          </p:nvSpPr>
+          <p:spPr>
+            <a:xfrm>
+              <a:off x="8584403" y="1825625"/>
+              <a:ext cx="0" cy="3765197"/>
+            </a:xfrm>
+            <a:custGeom>
+              <a:avLst/>
+              <a:pathLst>
+                <a:path w="0" h="3765197">
+                  <a:moveTo>
+                    <a:pt x="0" y="3765197"/>
+                  </a:moveTo>
+                  <a:lnTo>
+                    <a:pt x="0" y="0"/>
+                  </a:lnTo>
+                </a:path>
+              </a:pathLst>
+            </a:custGeom>
+            <a:ln w="13550" cap="flat">
+              <a:solidFill>
+                <a:srgbClr val="FFFFFF">
+                  <a:alpha val="100000"/>
+                </a:srgbClr>
+              </a:solidFill>
+              <a:prstDash val="solid"/>
+              <a:round/>
+            </a:ln>
+          </p:spPr>
+          <p:txBody>
+            <a:bodyPr/>
+            <a:lstStyle/>
+            <a:p/>
+          </p:txBody>
+        </p:sp>
+        <p:sp>
+          <p:nvSpPr>
+            <p:cNvPr id="36" name="pt34"/>
+            <p:cNvSpPr/>
+            <p:nvPr/>
+          </p:nvSpPr>
+          <p:spPr>
+            <a:xfrm>
+              <a:off x="5694304" y="5276198"/>
+              <a:ext cx="138135" cy="138135"/>
+            </a:xfrm>
+            <a:prstGeom prst="ellipse">
+              <a:avLst/>
+            </a:prstGeom>
+            <a:solidFill>
+              <a:srgbClr val="000000">
+                <a:alpha val="100000"/>
+              </a:srgbClr>
+            </a:solidFill>
+            <a:ln w="21600" cap="rnd">
+              <a:solidFill>
+                <a:srgbClr val="000000">
+                  <a:alpha val="100000"/>
+                </a:srgbClr>
+              </a:solidFill>
+              <a:prstDash val="solid"/>
+              <a:round/>
+            </a:ln>
+          </p:spPr>
+          <p:txBody>
+            <a:bodyPr/>
+            <a:lstStyle/>
+            <a:p/>
+          </p:txBody>
+        </p:sp>
+        <p:sp>
+          <p:nvSpPr>
+            <p:cNvPr id="37" name="pt35"/>
+            <p:cNvSpPr/>
+            <p:nvPr/>
+          </p:nvSpPr>
+          <p:spPr>
+            <a:xfrm>
+              <a:off x="4514214" y="5276198"/>
+              <a:ext cx="138135" cy="138135"/>
+            </a:xfrm>
+            <a:prstGeom prst="ellipse">
+              <a:avLst/>
+            </a:prstGeom>
+            <a:solidFill>
+              <a:srgbClr val="FFFFFF">
+                <a:alpha val="100000"/>
+              </a:srgbClr>
+            </a:solidFill>
+            <a:ln w="21600" cap="rnd">
+              <a:solidFill>
+                <a:srgbClr val="000000">
+                  <a:alpha val="100000"/>
+                </a:srgbClr>
+              </a:solidFill>
+              <a:prstDash val="solid"/>
+              <a:round/>
+            </a:ln>
+          </p:spPr>
+          <p:txBody>
+            <a:bodyPr/>
+            <a:lstStyle/>
+            <a:p/>
+          </p:txBody>
+        </p:sp>
+        <p:sp>
+          <p:nvSpPr>
+            <p:cNvPr id="38" name="pt36"/>
+            <p:cNvSpPr/>
+            <p:nvPr/>
+          </p:nvSpPr>
+          <p:spPr>
+            <a:xfrm>
+              <a:off x="6341814" y="3639155"/>
+              <a:ext cx="138135" cy="138135"/>
+            </a:xfrm>
+            <a:prstGeom prst="ellipse">
+              <a:avLst/>
+            </a:prstGeom>
+            <a:solidFill>
+              <a:srgbClr val="000000">
+                <a:alpha val="100000"/>
+              </a:srgbClr>
+            </a:solidFill>
+            <a:ln w="21600" cap="rnd">
+              <a:solidFill>
+                <a:srgbClr val="000000">
+                  <a:alpha val="100000"/>
+                </a:srgbClr>
+              </a:solidFill>
+              <a:prstDash val="solid"/>
+              <a:round/>
+            </a:ln>
+          </p:spPr>
+          <p:txBody>
+            <a:bodyPr/>
+            <a:lstStyle/>
+            <a:p/>
+          </p:txBody>
+        </p:sp>
+        <p:sp>
+          <p:nvSpPr>
+            <p:cNvPr id="39" name="pt37"/>
+            <p:cNvSpPr/>
+            <p:nvPr/>
+          </p:nvSpPr>
+          <p:spPr>
+            <a:xfrm>
+              <a:off x="3477912" y="3639155"/>
+              <a:ext cx="138135" cy="138135"/>
+            </a:xfrm>
+            <a:prstGeom prst="ellipse">
+              <a:avLst/>
+            </a:prstGeom>
+            <a:solidFill>
+              <a:srgbClr val="FFFFFF">
+                <a:alpha val="100000"/>
+              </a:srgbClr>
+            </a:solidFill>
+            <a:ln w="21600" cap="rnd">
+              <a:solidFill>
+                <a:srgbClr val="000000">
+                  <a:alpha val="100000"/>
+                </a:srgbClr>
+              </a:solidFill>
+              <a:prstDash val="solid"/>
+              <a:round/>
+            </a:ln>
+          </p:spPr>
+          <p:txBody>
+            <a:bodyPr/>
+            <a:lstStyle/>
+            <a:p/>
+          </p:txBody>
+        </p:sp>
+        <p:sp>
+          <p:nvSpPr>
+            <p:cNvPr id="40" name="pt38"/>
+            <p:cNvSpPr/>
+            <p:nvPr/>
+          </p:nvSpPr>
+          <p:spPr>
+            <a:xfrm>
+              <a:off x="6100899" y="2820634"/>
+              <a:ext cx="138135" cy="138135"/>
+            </a:xfrm>
+            <a:prstGeom prst="ellipse">
+              <a:avLst/>
+            </a:prstGeom>
+            <a:solidFill>
+              <a:srgbClr val="000000">
+                <a:alpha val="100000"/>
+              </a:srgbClr>
+            </a:solidFill>
+            <a:ln w="21600" cap="rnd">
+              <a:solidFill>
+                <a:srgbClr val="000000">
+                  <a:alpha val="100000"/>
+                </a:srgbClr>
+              </a:solidFill>
+              <a:prstDash val="solid"/>
+              <a:round/>
+            </a:ln>
+          </p:spPr>
+          <p:txBody>
+            <a:bodyPr/>
+            <a:lstStyle/>
+            <a:p/>
+          </p:txBody>
+        </p:sp>
+        <p:sp>
+          <p:nvSpPr>
+            <p:cNvPr id="41" name="pt39"/>
+            <p:cNvSpPr/>
+            <p:nvPr/>
+          </p:nvSpPr>
+          <p:spPr>
+            <a:xfrm>
+              <a:off x="4794692" y="2820634"/>
+              <a:ext cx="138135" cy="138135"/>
+            </a:xfrm>
+            <a:prstGeom prst="ellipse">
+              <a:avLst/>
+            </a:prstGeom>
+            <a:solidFill>
+              <a:srgbClr val="FFFFFF">
+                <a:alpha val="100000"/>
+              </a:srgbClr>
+            </a:solidFill>
+            <a:ln w="21600" cap="rnd">
+              <a:solidFill>
+                <a:srgbClr val="000000">
+                  <a:alpha val="100000"/>
+                </a:srgbClr>
+              </a:solidFill>
+              <a:prstDash val="solid"/>
+              <a:round/>
+            </a:ln>
+          </p:spPr>
+          <p:txBody>
+            <a:bodyPr/>
+            <a:lstStyle/>
+            <a:p/>
+          </p:txBody>
+        </p:sp>
+        <p:sp>
+          <p:nvSpPr>
+            <p:cNvPr id="42" name="pt40"/>
+            <p:cNvSpPr/>
+            <p:nvPr/>
+          </p:nvSpPr>
+          <p:spPr>
+            <a:xfrm>
+              <a:off x="8653087" y="2411374"/>
+              <a:ext cx="138135" cy="138135"/>
+            </a:xfrm>
+            <a:prstGeom prst="ellipse">
+              <a:avLst/>
+            </a:prstGeom>
+            <a:solidFill>
+              <a:srgbClr val="000000">
+                <a:alpha val="100000"/>
+              </a:srgbClr>
+            </a:solidFill>
+            <a:ln w="21600" cap="rnd">
+              <a:solidFill>
+                <a:srgbClr val="000000">
+                  <a:alpha val="100000"/>
+                </a:srgbClr>
+              </a:solidFill>
+              <a:prstDash val="solid"/>
+              <a:round/>
+            </a:ln>
+          </p:spPr>
+          <p:txBody>
+            <a:bodyPr/>
+            <a:lstStyle/>
+            <a:p/>
+          </p:txBody>
+        </p:sp>
+        <p:sp>
+          <p:nvSpPr>
+            <p:cNvPr id="43" name="pt41"/>
+            <p:cNvSpPr/>
+            <p:nvPr/>
+          </p:nvSpPr>
+          <p:spPr>
+            <a:xfrm>
+              <a:off x="8376825" y="2411374"/>
+              <a:ext cx="138135" cy="138135"/>
+            </a:xfrm>
+            <a:prstGeom prst="ellipse">
+              <a:avLst/>
+            </a:prstGeom>
+            <a:solidFill>
+              <a:srgbClr val="FFFFFF">
+                <a:alpha val="100000"/>
+              </a:srgbClr>
+            </a:solidFill>
+            <a:ln w="21600" cap="rnd">
+              <a:solidFill>
+                <a:srgbClr val="000000">
+                  <a:alpha val="100000"/>
+                </a:srgbClr>
+              </a:solidFill>
+              <a:prstDash val="solid"/>
+              <a:round/>
+            </a:ln>
+          </p:spPr>
+          <p:txBody>
+            <a:bodyPr/>
+            <a:lstStyle/>
+            <a:p/>
+          </p:txBody>
+        </p:sp>
+        <p:sp>
+          <p:nvSpPr>
+            <p:cNvPr id="44" name="pt42"/>
+            <p:cNvSpPr/>
+            <p:nvPr/>
+          </p:nvSpPr>
+          <p:spPr>
+            <a:xfrm>
+              <a:off x="7003901" y="2002113"/>
+              <a:ext cx="138135" cy="138135"/>
+            </a:xfrm>
+            <a:prstGeom prst="ellipse">
+              <a:avLst/>
+            </a:prstGeom>
+            <a:solidFill>
+              <a:srgbClr val="000000">
+                <a:alpha val="100000"/>
+              </a:srgbClr>
+            </a:solidFill>
+            <a:ln w="21600" cap="rnd">
+              <a:solidFill>
+                <a:srgbClr val="000000">
+                  <a:alpha val="100000"/>
+                </a:srgbClr>
+              </a:solidFill>
+              <a:prstDash val="solid"/>
+              <a:round/>
+            </a:ln>
+          </p:spPr>
+          <p:txBody>
+            <a:bodyPr/>
+            <a:lstStyle/>
+            <a:p/>
+          </p:txBody>
+        </p:sp>
+        <p:sp>
+          <p:nvSpPr>
+            <p:cNvPr id="45" name="pt43"/>
+            <p:cNvSpPr/>
+            <p:nvPr/>
+          </p:nvSpPr>
+          <p:spPr>
+            <a:xfrm>
+              <a:off x="6447728" y="2002113"/>
+              <a:ext cx="138135" cy="138135"/>
+            </a:xfrm>
+            <a:prstGeom prst="ellipse">
+              <a:avLst/>
+            </a:prstGeom>
+            <a:solidFill>
+              <a:srgbClr val="FFFFFF">
+                <a:alpha val="100000"/>
+              </a:srgbClr>
+            </a:solidFill>
+            <a:ln w="21600" cap="rnd">
+              <a:solidFill>
+                <a:srgbClr val="000000">
+                  <a:alpha val="100000"/>
+                </a:srgbClr>
+              </a:solidFill>
+              <a:prstDash val="solid"/>
+              <a:round/>
+            </a:ln>
+          </p:spPr>
+          <p:txBody>
+            <a:bodyPr/>
+            <a:lstStyle/>
+            <a:p/>
+          </p:txBody>
+        </p:sp>
+        <p:sp>
+          <p:nvSpPr>
+            <p:cNvPr id="46" name="pt44"/>
+            <p:cNvSpPr/>
+            <p:nvPr/>
+          </p:nvSpPr>
+          <p:spPr>
+            <a:xfrm>
+              <a:off x="4646977" y="4457677"/>
+              <a:ext cx="138135" cy="138135"/>
+            </a:xfrm>
+            <a:prstGeom prst="ellipse">
+              <a:avLst/>
+            </a:prstGeom>
+            <a:solidFill>
+              <a:srgbClr val="000000">
+                <a:alpha val="100000"/>
+              </a:srgbClr>
+            </a:solidFill>
+            <a:ln w="21600" cap="rnd">
+              <a:solidFill>
+                <a:srgbClr val="000000">
+                  <a:alpha val="100000"/>
+                </a:srgbClr>
+              </a:solidFill>
+              <a:prstDash val="solid"/>
+              <a:round/>
+            </a:ln>
+          </p:spPr>
+          <p:txBody>
+            <a:bodyPr/>
+            <a:lstStyle/>
+            <a:p/>
+          </p:txBody>
+        </p:sp>
+        <p:sp>
+          <p:nvSpPr>
+            <p:cNvPr id="47" name="pt45"/>
+            <p:cNvSpPr/>
+            <p:nvPr/>
+          </p:nvSpPr>
+          <p:spPr>
+            <a:xfrm>
+              <a:off x="5186062" y="4457677"/>
+              <a:ext cx="138135" cy="138135"/>
+            </a:xfrm>
+            <a:prstGeom prst="ellipse">
+              <a:avLst/>
+            </a:prstGeom>
+            <a:solidFill>
+              <a:srgbClr val="FFFFFF">
+                <a:alpha val="100000"/>
+              </a:srgbClr>
+            </a:solidFill>
+            <a:ln w="21600" cap="rnd">
+              <a:solidFill>
+                <a:srgbClr val="000000">
+                  <a:alpha val="100000"/>
+                </a:srgbClr>
+              </a:solidFill>
+              <a:prstDash val="solid"/>
+              <a:round/>
+            </a:ln>
+          </p:spPr>
+          <p:txBody>
+            <a:bodyPr/>
+            <a:lstStyle/>
+            <a:p/>
+          </p:txBody>
+        </p:sp>
+        <p:sp>
+          <p:nvSpPr>
+            <p:cNvPr id="48" name="pt46"/>
+            <p:cNvSpPr/>
+            <p:nvPr/>
+          </p:nvSpPr>
+          <p:spPr>
+            <a:xfrm>
+              <a:off x="4339168" y="4048416"/>
+              <a:ext cx="138135" cy="138135"/>
+            </a:xfrm>
+            <a:prstGeom prst="ellipse">
+              <a:avLst/>
+            </a:prstGeom>
+            <a:solidFill>
+              <a:srgbClr val="000000">
+                <a:alpha val="100000"/>
+              </a:srgbClr>
+            </a:solidFill>
+            <a:ln w="21600" cap="rnd">
+              <a:solidFill>
+                <a:srgbClr val="000000">
+                  <a:alpha val="100000"/>
+                </a:srgbClr>
+              </a:solidFill>
+              <a:prstDash val="solid"/>
+              <a:round/>
+            </a:ln>
+          </p:spPr>
+          <p:txBody>
+            <a:bodyPr/>
+            <a:lstStyle/>
+            <a:p/>
+          </p:txBody>
+        </p:sp>
+        <p:sp>
+          <p:nvSpPr>
+            <p:cNvPr id="49" name="pt47"/>
+            <p:cNvSpPr/>
+            <p:nvPr/>
+          </p:nvSpPr>
+          <p:spPr>
+            <a:xfrm>
+              <a:off x="7205264" y="4048416"/>
+              <a:ext cx="138135" cy="138135"/>
+            </a:xfrm>
+            <a:prstGeom prst="ellipse">
+              <a:avLst/>
+            </a:prstGeom>
+            <a:solidFill>
+              <a:srgbClr val="FFFFFF">
+                <a:alpha val="100000"/>
+              </a:srgbClr>
+            </a:solidFill>
+            <a:ln w="21600" cap="rnd">
+              <a:solidFill>
+                <a:srgbClr val="000000">
+                  <a:alpha val="100000"/>
+                </a:srgbClr>
+              </a:solidFill>
+              <a:prstDash val="solid"/>
+              <a:round/>
+            </a:ln>
+          </p:spPr>
+          <p:txBody>
+            <a:bodyPr/>
+            <a:lstStyle/>
+            <a:p/>
+          </p:txBody>
+        </p:sp>
+        <p:sp>
+          <p:nvSpPr>
+            <p:cNvPr id="50" name="pt48"/>
+            <p:cNvSpPr/>
+            <p:nvPr/>
+          </p:nvSpPr>
+          <p:spPr>
+            <a:xfrm>
+              <a:off x="7448651" y="3229895"/>
+              <a:ext cx="138135" cy="138135"/>
+            </a:xfrm>
+            <a:prstGeom prst="ellipse">
+              <a:avLst/>
+            </a:prstGeom>
+            <a:solidFill>
+              <a:srgbClr val="000000">
+                <a:alpha val="100000"/>
+              </a:srgbClr>
+            </a:solidFill>
+            <a:ln w="21600" cap="rnd">
+              <a:solidFill>
+                <a:srgbClr val="000000">
+                  <a:alpha val="100000"/>
+                </a:srgbClr>
+              </a:solidFill>
+              <a:prstDash val="solid"/>
+              <a:round/>
+            </a:ln>
+          </p:spPr>
+          <p:txBody>
+            <a:bodyPr/>
+            <a:lstStyle/>
+            <a:p/>
+          </p:txBody>
+        </p:sp>
+        <p:sp>
+          <p:nvSpPr>
+            <p:cNvPr id="51" name="pt49"/>
+            <p:cNvSpPr/>
+            <p:nvPr/>
+          </p:nvSpPr>
+          <p:spPr>
+            <a:xfrm>
+              <a:off x="8071371" y="3229895"/>
+              <a:ext cx="138135" cy="138135"/>
+            </a:xfrm>
+            <a:prstGeom prst="ellipse">
+              <a:avLst/>
+            </a:prstGeom>
+            <a:solidFill>
+              <a:srgbClr val="FFFFFF">
+                <a:alpha val="100000"/>
+              </a:srgbClr>
+            </a:solidFill>
+            <a:ln w="21600" cap="rnd">
+              <a:solidFill>
+                <a:srgbClr val="000000">
+                  <a:alpha val="100000"/>
+                </a:srgbClr>
+              </a:solidFill>
+              <a:prstDash val="solid"/>
+              <a:round/>
+            </a:ln>
+          </p:spPr>
+          <p:txBody>
+            <a:bodyPr/>
+            <a:lstStyle/>
+            <a:p/>
+          </p:txBody>
+        </p:sp>
+        <p:sp>
+          <p:nvSpPr>
+            <p:cNvPr id="52" name="pt50"/>
+            <p:cNvSpPr/>
+            <p:nvPr/>
+          </p:nvSpPr>
+          <p:spPr>
+            <a:xfrm>
+              <a:off x="3644447" y="4866937"/>
+              <a:ext cx="138135" cy="138135"/>
+            </a:xfrm>
+            <a:prstGeom prst="ellipse">
+              <a:avLst/>
+            </a:prstGeom>
+            <a:solidFill>
+              <a:srgbClr val="000000">
+                <a:alpha val="100000"/>
+              </a:srgbClr>
+            </a:solidFill>
+            <a:ln w="21600" cap="rnd">
+              <a:solidFill>
+                <a:srgbClr val="000000">
+                  <a:alpha val="100000"/>
+                </a:srgbClr>
+              </a:solidFill>
+              <a:prstDash val="solid"/>
+              <a:round/>
+            </a:ln>
+          </p:spPr>
+          <p:txBody>
+            <a:bodyPr/>
+            <a:lstStyle/>
+            <a:p/>
+          </p:txBody>
+        </p:sp>
+        <p:sp>
+          <p:nvSpPr>
+            <p:cNvPr id="53" name="pt51"/>
+            <p:cNvSpPr/>
+            <p:nvPr/>
+          </p:nvSpPr>
+          <p:spPr>
+            <a:xfrm>
+              <a:off x="5515960" y="4866937"/>
+              <a:ext cx="138135" cy="138135"/>
+            </a:xfrm>
+            <a:prstGeom prst="ellipse">
+              <a:avLst/>
+            </a:prstGeom>
+            <a:solidFill>
+              <a:srgbClr val="FFFFFF">
+                <a:alpha val="100000"/>
+              </a:srgbClr>
+            </a:solidFill>
+            <a:ln w="21600" cap="rnd">
+              <a:solidFill>
+                <a:srgbClr val="000000">
+                  <a:alpha val="100000"/>
+                </a:srgbClr>
+              </a:solidFill>
+              <a:prstDash val="solid"/>
+              <a:round/>
+            </a:ln>
+          </p:spPr>
+          <p:txBody>
+            <a:bodyPr/>
+            <a:lstStyle/>
+            <a:p/>
+          </p:txBody>
+        </p:sp>
+        <p:sp>
+          <p:nvSpPr>
+            <p:cNvPr id="54" name="tx52"/>
             <p:cNvSpPr/>
             <p:nvPr/>
           </p:nvSpPr>
@@ -5572,7 +5327,7 @@
         </p:sp>
         <p:sp>
           <p:nvSpPr>
-            <p:cNvPr id="62" name="tx60"/>
+            <p:cNvPr id="55" name="tx53"/>
             <p:cNvSpPr/>
             <p:nvPr/>
           </p:nvSpPr>
@@ -5618,7 +5373,7 @@
         </p:sp>
         <p:sp>
           <p:nvSpPr>
-            <p:cNvPr id="63" name="tx61"/>
+            <p:cNvPr id="56" name="tx54"/>
             <p:cNvSpPr/>
             <p:nvPr/>
           </p:nvSpPr>
@@ -5664,7 +5419,7 @@
         </p:sp>
         <p:sp>
           <p:nvSpPr>
-            <p:cNvPr id="64" name="tx62"/>
+            <p:cNvPr id="57" name="tx55"/>
             <p:cNvSpPr/>
             <p:nvPr/>
           </p:nvSpPr>
@@ -5710,7 +5465,7 @@
         </p:sp>
         <p:sp>
           <p:nvSpPr>
-            <p:cNvPr id="65" name="tx63"/>
+            <p:cNvPr id="58" name="tx56"/>
             <p:cNvSpPr/>
             <p:nvPr/>
           </p:nvSpPr>
@@ -5756,7 +5511,7 @@
         </p:sp>
         <p:sp>
           <p:nvSpPr>
-            <p:cNvPr id="66" name="tx64"/>
+            <p:cNvPr id="59" name="tx57"/>
             <p:cNvSpPr/>
             <p:nvPr/>
           </p:nvSpPr>
@@ -5802,7 +5557,7 @@
         </p:sp>
         <p:sp>
           <p:nvSpPr>
-            <p:cNvPr id="67" name="tx65"/>
+            <p:cNvPr id="60" name="tx58"/>
             <p:cNvSpPr/>
             <p:nvPr/>
           </p:nvSpPr>
@@ -5848,7 +5603,7 @@
         </p:sp>
         <p:sp>
           <p:nvSpPr>
-            <p:cNvPr id="68" name="tx66"/>
+            <p:cNvPr id="61" name="tx59"/>
             <p:cNvSpPr/>
             <p:nvPr/>
           </p:nvSpPr>
@@ -5894,7 +5649,7 @@
         </p:sp>
         <p:sp>
           <p:nvSpPr>
-            <p:cNvPr id="69" name="tx67"/>
+            <p:cNvPr id="62" name="tx60"/>
             <p:cNvSpPr/>
             <p:nvPr/>
           </p:nvSpPr>
@@ -5940,7 +5695,7 @@
         </p:sp>
         <p:sp>
           <p:nvSpPr>
-            <p:cNvPr id="70" name="pl68"/>
+            <p:cNvPr id="63" name="pl61"/>
             <p:cNvSpPr/>
             <p:nvPr/>
           </p:nvSpPr>
@@ -5980,13 +5735,13 @@
         </p:sp>
         <p:sp>
           <p:nvSpPr>
-            <p:cNvPr id="71" name="pl69"/>
-            <p:cNvSpPr/>
-            <p:nvPr/>
-          </p:nvSpPr>
-          <p:spPr>
-            <a:xfrm>
-              <a:off x="2570083" y="5590822"/>
+            <p:cNvPr id="64" name="pl62"/>
+            <p:cNvSpPr/>
+            <p:nvPr/>
+          </p:nvSpPr>
+          <p:spPr>
+            <a:xfrm>
+              <a:off x="2745960" y="5590822"/>
               <a:ext cx="0" cy="34794"/>
             </a:xfrm>
             <a:custGeom>
@@ -6020,13 +5775,13 @@
         </p:sp>
         <p:sp>
           <p:nvSpPr>
-            <p:cNvPr id="72" name="pl70"/>
-            <p:cNvSpPr/>
-            <p:nvPr/>
-          </p:nvSpPr>
-          <p:spPr>
-            <a:xfrm>
-              <a:off x="3319208" y="5590822"/>
+            <p:cNvPr id="65" name="pl63"/>
+            <p:cNvSpPr/>
+            <p:nvPr/>
+          </p:nvSpPr>
+          <p:spPr>
+            <a:xfrm>
+              <a:off x="3394676" y="5590822"/>
               <a:ext cx="0" cy="34794"/>
             </a:xfrm>
             <a:custGeom>
@@ -6060,13 +5815,13 @@
         </p:sp>
         <p:sp>
           <p:nvSpPr>
-            <p:cNvPr id="73" name="pl71"/>
-            <p:cNvSpPr/>
-            <p:nvPr/>
-          </p:nvSpPr>
-          <p:spPr>
-            <a:xfrm>
-              <a:off x="4068333" y="5590822"/>
+            <p:cNvPr id="66" name="pl64"/>
+            <p:cNvSpPr/>
+            <p:nvPr/>
+          </p:nvSpPr>
+          <p:spPr>
+            <a:xfrm>
+              <a:off x="4043392" y="5590822"/>
               <a:ext cx="0" cy="34794"/>
             </a:xfrm>
             <a:custGeom>
@@ -6100,13 +5855,13 @@
         </p:sp>
         <p:sp>
           <p:nvSpPr>
-            <p:cNvPr id="74" name="pl72"/>
-            <p:cNvSpPr/>
-            <p:nvPr/>
-          </p:nvSpPr>
-          <p:spPr>
-            <a:xfrm>
-              <a:off x="4817457" y="5590822"/>
+            <p:cNvPr id="67" name="pl65"/>
+            <p:cNvSpPr/>
+            <p:nvPr/>
+          </p:nvSpPr>
+          <p:spPr>
+            <a:xfrm>
+              <a:off x="4692108" y="5590822"/>
               <a:ext cx="0" cy="34794"/>
             </a:xfrm>
             <a:custGeom>
@@ -6140,13 +5895,13 @@
         </p:sp>
         <p:sp>
           <p:nvSpPr>
-            <p:cNvPr id="75" name="pl73"/>
-            <p:cNvSpPr/>
-            <p:nvPr/>
-          </p:nvSpPr>
-          <p:spPr>
-            <a:xfrm>
-              <a:off x="5566582" y="5590822"/>
+            <p:cNvPr id="68" name="pl66"/>
+            <p:cNvSpPr/>
+            <p:nvPr/>
+          </p:nvSpPr>
+          <p:spPr>
+            <a:xfrm>
+              <a:off x="5340823" y="5590822"/>
               <a:ext cx="0" cy="34794"/>
             </a:xfrm>
             <a:custGeom>
@@ -6180,13 +5935,13 @@
         </p:sp>
         <p:sp>
           <p:nvSpPr>
-            <p:cNvPr id="76" name="pl74"/>
-            <p:cNvSpPr/>
-            <p:nvPr/>
-          </p:nvSpPr>
-          <p:spPr>
-            <a:xfrm>
-              <a:off x="6315707" y="5590822"/>
+            <p:cNvPr id="69" name="pl67"/>
+            <p:cNvSpPr/>
+            <p:nvPr/>
+          </p:nvSpPr>
+          <p:spPr>
+            <a:xfrm>
+              <a:off x="5989539" y="5590822"/>
               <a:ext cx="0" cy="34794"/>
             </a:xfrm>
             <a:custGeom>
@@ -6220,13 +5975,13 @@
         </p:sp>
         <p:sp>
           <p:nvSpPr>
-            <p:cNvPr id="77" name="pl75"/>
-            <p:cNvSpPr/>
-            <p:nvPr/>
-          </p:nvSpPr>
-          <p:spPr>
-            <a:xfrm>
-              <a:off x="7064832" y="5590822"/>
+            <p:cNvPr id="70" name="pl68"/>
+            <p:cNvSpPr/>
+            <p:nvPr/>
+          </p:nvSpPr>
+          <p:spPr>
+            <a:xfrm>
+              <a:off x="6638255" y="5590822"/>
               <a:ext cx="0" cy="34794"/>
             </a:xfrm>
             <a:custGeom>
@@ -6260,13 +6015,13 @@
         </p:sp>
         <p:sp>
           <p:nvSpPr>
-            <p:cNvPr id="78" name="pl76"/>
-            <p:cNvSpPr/>
-            <p:nvPr/>
-          </p:nvSpPr>
-          <p:spPr>
-            <a:xfrm>
-              <a:off x="7813957" y="5590822"/>
+            <p:cNvPr id="71" name="pl69"/>
+            <p:cNvSpPr/>
+            <p:nvPr/>
+          </p:nvSpPr>
+          <p:spPr>
+            <a:xfrm>
+              <a:off x="7286971" y="5590822"/>
               <a:ext cx="0" cy="34794"/>
             </a:xfrm>
             <a:custGeom>
@@ -6300,13 +6055,13 @@
         </p:sp>
         <p:sp>
           <p:nvSpPr>
-            <p:cNvPr id="79" name="pl77"/>
-            <p:cNvSpPr/>
-            <p:nvPr/>
-          </p:nvSpPr>
-          <p:spPr>
-            <a:xfrm>
-              <a:off x="8563082" y="5590822"/>
+            <p:cNvPr id="72" name="pl70"/>
+            <p:cNvSpPr/>
+            <p:nvPr/>
+          </p:nvSpPr>
+          <p:spPr>
+            <a:xfrm>
+              <a:off x="7935687" y="5590822"/>
               <a:ext cx="0" cy="34794"/>
             </a:xfrm>
             <a:custGeom>
@@ -6340,13 +6095,99 @@
         </p:sp>
         <p:sp>
           <p:nvSpPr>
-            <p:cNvPr id="80" name="tx78"/>
-            <p:cNvSpPr/>
-            <p:nvPr/>
-          </p:nvSpPr>
-          <p:spPr>
-            <a:xfrm>
-              <a:off x="2455327" y="5656918"/>
+            <p:cNvPr id="73" name="pl71"/>
+            <p:cNvSpPr/>
+            <p:nvPr/>
+          </p:nvSpPr>
+          <p:spPr>
+            <a:xfrm>
+              <a:off x="8584403" y="5590822"/>
+              <a:ext cx="0" cy="34794"/>
+            </a:xfrm>
+            <a:custGeom>
+              <a:avLst/>
+              <a:pathLst>
+                <a:path w="0" h="34794">
+                  <a:moveTo>
+                    <a:pt x="0" y="34794"/>
+                  </a:moveTo>
+                  <a:lnTo>
+                    <a:pt x="0" y="0"/>
+                  </a:lnTo>
+                </a:path>
+              </a:pathLst>
+            </a:custGeom>
+            <a:ln w="16260" cap="flat">
+              <a:solidFill>
+                <a:srgbClr val="000000">
+                  <a:alpha val="100000"/>
+                </a:srgbClr>
+              </a:solidFill>
+              <a:prstDash val="solid"/>
+              <a:round/>
+            </a:ln>
+          </p:spPr>
+          <p:txBody>
+            <a:bodyPr/>
+            <a:lstStyle/>
+            <a:p/>
+          </p:txBody>
+        </p:sp>
+        <p:sp>
+          <p:nvSpPr>
+            <p:cNvPr id="74" name="tx72"/>
+            <p:cNvSpPr/>
+            <p:nvPr/>
+          </p:nvSpPr>
+          <p:spPr>
+            <a:xfrm>
+              <a:off x="2631204" y="5653291"/>
+              <a:ext cx="229511" cy="118585"/>
+            </a:xfrm>
+            <a:prstGeom prst="rect">
+              <a:avLst/>
+            </a:prstGeom>
+            <a:noFill/>
+          </p:spPr>
+          <p:txBody>
+            <a:bodyPr lIns="0" rIns="0" tIns="0" bIns="0" anchorCtr="1" anchor="ctr" wrap="none"/>
+            <a:lstStyle/>
+            <a:p>
+              <a:pPr algn="l" marL="0" marR="0" indent="0">
+                <a:lnSpc>
+                  <a:spcPts val="1300"/>
+                </a:lnSpc>
+                <a:spcBef>
+                  <a:spcPts val="0"/>
+                </a:spcBef>
+                <a:spcAft>
+                  <a:spcPts val="0"/>
+                </a:spcAft>
+              </a:pPr>
+              <a:r>
+                <a:rPr sz="1300">
+                  <a:solidFill>
+                    <a:srgbClr val="4D4D4D">
+                      <a:alpha val="100000"/>
+                    </a:srgbClr>
+                  </a:solidFill>
+                  <a:latin typeface="Helvetica"/>
+                  <a:cs typeface="Helvetica"/>
+                </a:rPr>
+                <a:t>1.0</a:t>
+              </a:r>
+            </a:p>
+          </p:txBody>
+        </p:sp>
+        <p:sp>
+          <p:nvSpPr>
+            <p:cNvPr id="75" name="tx73"/>
+            <p:cNvSpPr/>
+            <p:nvPr/>
+          </p:nvSpPr>
+          <p:spPr>
+            <a:xfrm>
+              <a:off x="3279920" y="5656918"/>
               <a:ext cx="229511" cy="114957"/>
             </a:xfrm>
             <a:prstGeom prst="rect">
@@ -6386,13 +6227,13 @@
         </p:sp>
         <p:sp>
           <p:nvSpPr>
-            <p:cNvPr id="81" name="tx79"/>
-            <p:cNvSpPr/>
-            <p:nvPr/>
-          </p:nvSpPr>
-          <p:spPr>
-            <a:xfrm>
-              <a:off x="3204452" y="5656032"/>
+            <p:cNvPr id="76" name="tx74"/>
+            <p:cNvSpPr/>
+            <p:nvPr/>
+          </p:nvSpPr>
+          <p:spPr>
+            <a:xfrm>
+              <a:off x="3928636" y="5656032"/>
               <a:ext cx="229511" cy="115844"/>
             </a:xfrm>
             <a:prstGeom prst="rect">
@@ -6432,13 +6273,13 @@
         </p:sp>
         <p:sp>
           <p:nvSpPr>
-            <p:cNvPr id="82" name="tx80"/>
-            <p:cNvSpPr/>
-            <p:nvPr/>
-          </p:nvSpPr>
-          <p:spPr>
-            <a:xfrm>
-              <a:off x="3953577" y="5653129"/>
+            <p:cNvPr id="77" name="tx75"/>
+            <p:cNvSpPr/>
+            <p:nvPr/>
+          </p:nvSpPr>
+          <p:spPr>
+            <a:xfrm>
+              <a:off x="4577352" y="5653129"/>
               <a:ext cx="229511" cy="118746"/>
             </a:xfrm>
             <a:prstGeom prst="rect">
@@ -6478,13 +6319,13 @@
         </p:sp>
         <p:sp>
           <p:nvSpPr>
-            <p:cNvPr id="83" name="tx81"/>
-            <p:cNvSpPr/>
-            <p:nvPr/>
-          </p:nvSpPr>
-          <p:spPr>
-            <a:xfrm>
-              <a:off x="4702702" y="5656112"/>
+            <p:cNvPr id="78" name="tx76"/>
+            <p:cNvSpPr/>
+            <p:nvPr/>
+          </p:nvSpPr>
+          <p:spPr>
+            <a:xfrm>
+              <a:off x="5226068" y="5656112"/>
               <a:ext cx="229511" cy="115763"/>
             </a:xfrm>
             <a:prstGeom prst="rect">
@@ -6524,13 +6365,13 @@
         </p:sp>
         <p:sp>
           <p:nvSpPr>
-            <p:cNvPr id="84" name="tx82"/>
-            <p:cNvSpPr/>
-            <p:nvPr/>
-          </p:nvSpPr>
-          <p:spPr>
-            <a:xfrm>
-              <a:off x="5451826" y="5654016"/>
+            <p:cNvPr id="79" name="tx77"/>
+            <p:cNvSpPr/>
+            <p:nvPr/>
+          </p:nvSpPr>
+          <p:spPr>
+            <a:xfrm>
+              <a:off x="5874784" y="5654016"/>
               <a:ext cx="229511" cy="117859"/>
             </a:xfrm>
             <a:prstGeom prst="rect">
@@ -6570,13 +6411,13 @@
         </p:sp>
         <p:sp>
           <p:nvSpPr>
-            <p:cNvPr id="85" name="tx83"/>
-            <p:cNvSpPr/>
-            <p:nvPr/>
-          </p:nvSpPr>
-          <p:spPr>
-            <a:xfrm>
-              <a:off x="6200951" y="5652968"/>
+            <p:cNvPr id="80" name="tx78"/>
+            <p:cNvSpPr/>
+            <p:nvPr/>
+          </p:nvSpPr>
+          <p:spPr>
+            <a:xfrm>
+              <a:off x="6523499" y="5652968"/>
               <a:ext cx="229511" cy="118907"/>
             </a:xfrm>
             <a:prstGeom prst="rect">
@@ -6616,13 +6457,13 @@
         </p:sp>
         <p:sp>
           <p:nvSpPr>
-            <p:cNvPr id="86" name="tx84"/>
-            <p:cNvSpPr/>
-            <p:nvPr/>
-          </p:nvSpPr>
-          <p:spPr>
-            <a:xfrm>
-              <a:off x="6950076" y="5656918"/>
+            <p:cNvPr id="81" name="tx79"/>
+            <p:cNvSpPr/>
+            <p:nvPr/>
+          </p:nvSpPr>
+          <p:spPr>
+            <a:xfrm>
+              <a:off x="7172215" y="5656918"/>
               <a:ext cx="229511" cy="114957"/>
             </a:xfrm>
             <a:prstGeom prst="rect">
@@ -6662,13 +6503,13 @@
         </p:sp>
         <p:sp>
           <p:nvSpPr>
-            <p:cNvPr id="87" name="tx85"/>
-            <p:cNvSpPr/>
-            <p:nvPr/>
-          </p:nvSpPr>
-          <p:spPr>
-            <a:xfrm>
-              <a:off x="7699201" y="5652807"/>
+            <p:cNvPr id="82" name="tx80"/>
+            <p:cNvSpPr/>
+            <p:nvPr/>
+          </p:nvSpPr>
+          <p:spPr>
+            <a:xfrm>
+              <a:off x="7820931" y="5652807"/>
               <a:ext cx="229511" cy="119068"/>
             </a:xfrm>
             <a:prstGeom prst="rect">
@@ -6708,13 +6549,13 @@
         </p:sp>
         <p:sp>
           <p:nvSpPr>
-            <p:cNvPr id="88" name="tx86"/>
-            <p:cNvSpPr/>
-            <p:nvPr/>
-          </p:nvSpPr>
-          <p:spPr>
-            <a:xfrm>
-              <a:off x="8448326" y="5653049"/>
+            <p:cNvPr id="83" name="tx81"/>
+            <p:cNvSpPr/>
+            <p:nvPr/>
+          </p:nvSpPr>
+          <p:spPr>
+            <a:xfrm>
+              <a:off x="8469647" y="5653049"/>
               <a:ext cx="229511" cy="118826"/>
             </a:xfrm>
             <a:prstGeom prst="rect">
@@ -6754,7 +6595,7 @@
         </p:sp>
         <p:sp>
           <p:nvSpPr>
-            <p:cNvPr id="89" name="tx87"/>
+            <p:cNvPr id="84" name="tx82"/>
             <p:cNvSpPr/>
             <p:nvPr/>
           </p:nvSpPr>
@@ -6800,7 +6641,7 @@
         </p:sp>
         <p:sp>
           <p:nvSpPr>
-            <p:cNvPr id="90" name="rc88"/>
+            <p:cNvPr id="85" name="rc83"/>
             <p:cNvSpPr/>
             <p:nvPr/>
           </p:nvSpPr>
@@ -6826,7 +6667,7 @@
         </p:sp>
         <p:sp>
           <p:nvSpPr>
-            <p:cNvPr id="91" name="tx89"/>
+            <p:cNvPr id="86" name="tx84"/>
             <p:cNvSpPr/>
             <p:nvPr/>
           </p:nvSpPr>
@@ -6872,7 +6713,28 @@
         </p:sp>
         <p:sp>
           <p:nvSpPr>
-            <p:cNvPr id="92" name="pt90"/>
+            <p:cNvPr id="87" name="rc85"/>
+            <p:cNvSpPr/>
+            <p:nvPr/>
+          </p:nvSpPr>
+          <p:spPr>
+            <a:xfrm>
+              <a:off x="9229731" y="2946671"/>
+              <a:ext cx="219455" cy="219456"/>
+            </a:xfrm>
+            <a:prstGeom prst="rect">
+              <a:avLst/>
+            </a:prstGeom>
+          </p:spPr>
+          <p:txBody>
+            <a:bodyPr/>
+            <a:lstStyle/>
+            <a:p/>
+          </p:txBody>
+        </p:sp>
+        <p:sp>
+          <p:nvSpPr>
+            <p:cNvPr id="88" name="pt86"/>
             <p:cNvSpPr/>
             <p:nvPr/>
           </p:nvSpPr>
@@ -6907,7 +6769,28 @@
         </p:sp>
         <p:sp>
           <p:nvSpPr>
-            <p:cNvPr id="93" name="pt91"/>
+            <p:cNvPr id="89" name="rc87"/>
+            <p:cNvSpPr/>
+            <p:nvPr/>
+          </p:nvSpPr>
+          <p:spPr>
+            <a:xfrm>
+              <a:off x="9229731" y="3292653"/>
+              <a:ext cx="219455" cy="219456"/>
+            </a:xfrm>
+            <a:prstGeom prst="rect">
+              <a:avLst/>
+            </a:prstGeom>
+          </p:spPr>
+          <p:txBody>
+            <a:bodyPr/>
+            <a:lstStyle/>
+            <a:p/>
+          </p:txBody>
+        </p:sp>
+        <p:sp>
+          <p:nvSpPr>
+            <p:cNvPr id="90" name="pt88"/>
             <p:cNvSpPr/>
             <p:nvPr/>
           </p:nvSpPr>
@@ -6942,7 +6825,7 @@
         </p:sp>
         <p:sp>
           <p:nvSpPr>
-            <p:cNvPr id="94" name="tx92"/>
+            <p:cNvPr id="91" name="tx89"/>
             <p:cNvSpPr/>
             <p:nvPr/>
           </p:nvSpPr>
@@ -6988,7 +6871,7 @@
         </p:sp>
         <p:sp>
           <p:nvSpPr>
-            <p:cNvPr id="95" name="tx93"/>
+            <p:cNvPr id="92" name="tx90"/>
             <p:cNvSpPr/>
             <p:nvPr/>
           </p:nvSpPr>
@@ -7034,7 +6917,7 @@
         </p:sp>
         <p:sp>
           <p:nvSpPr>
-            <p:cNvPr id="96" name="rc94"/>
+            <p:cNvPr id="93" name="rc91"/>
             <p:cNvSpPr/>
             <p:nvPr/>
           </p:nvSpPr>
@@ -7060,7 +6943,7 @@
         </p:sp>
         <p:sp>
           <p:nvSpPr>
-            <p:cNvPr id="97" name="tx95"/>
+            <p:cNvPr id="94" name="tx92"/>
             <p:cNvSpPr/>
             <p:nvPr/>
           </p:nvSpPr>
@@ -7106,7 +6989,28 @@
         </p:sp>
         <p:sp>
           <p:nvSpPr>
-            <p:cNvPr id="98" name="pl96"/>
+            <p:cNvPr id="95" name="rc93"/>
+            <p:cNvSpPr/>
+            <p:nvPr/>
+          </p:nvSpPr>
+          <p:spPr>
+            <a:xfrm>
+              <a:off x="9229731" y="4209643"/>
+              <a:ext cx="219455" cy="219456"/>
+            </a:xfrm>
+            <a:prstGeom prst="rect">
+              <a:avLst/>
+            </a:prstGeom>
+          </p:spPr>
+          <p:txBody>
+            <a:bodyPr/>
+            <a:lstStyle/>
+            <a:p/>
+          </p:txBody>
+        </p:sp>
+        <p:sp>
+          <p:nvSpPr>
+            <p:cNvPr id="96" name="pl94"/>
             <p:cNvSpPr/>
             <p:nvPr/>
           </p:nvSpPr>
@@ -7146,7 +7050,28 @@
         </p:sp>
         <p:sp>
           <p:nvSpPr>
-            <p:cNvPr id="99" name="pl97"/>
+            <p:cNvPr id="97" name="rc95"/>
+            <p:cNvSpPr/>
+            <p:nvPr/>
+          </p:nvSpPr>
+          <p:spPr>
+            <a:xfrm>
+              <a:off x="9229731" y="4555625"/>
+              <a:ext cx="219455" cy="219455"/>
+            </a:xfrm>
+            <a:prstGeom prst="rect">
+              <a:avLst/>
+            </a:prstGeom>
+          </p:spPr>
+          <p:txBody>
+            <a:bodyPr/>
+            <a:lstStyle/>
+            <a:p/>
+          </p:txBody>
+        </p:sp>
+        <p:sp>
+          <p:nvSpPr>
+            <p:cNvPr id="98" name="pl96"/>
             <p:cNvSpPr/>
             <p:nvPr/>
           </p:nvSpPr>
@@ -7186,7 +7111,7 @@
         </p:sp>
         <p:sp>
           <p:nvSpPr>
-            <p:cNvPr id="100" name="tx98"/>
+            <p:cNvPr id="99" name="tx97"/>
             <p:cNvSpPr/>
             <p:nvPr/>
           </p:nvSpPr>
@@ -7232,7 +7157,7 @@
         </p:sp>
         <p:sp>
           <p:nvSpPr>
-            <p:cNvPr id="101" name="tx99"/>
+            <p:cNvPr id="100" name="tx98"/>
             <p:cNvSpPr/>
             <p:nvPr/>
           </p:nvSpPr>

</xml_diff>